<commit_message>
merge in upstream fprime 1.2
</commit_message>
<xml_diff>
--- a/docs/Architecture/FPrimeArchitectureShort.pptx
+++ b/docs/Architecture/FPrimeArchitectureShort.pptx
@@ -221,7 +221,7 @@
           <a:p>
             <a:fld id="{DB8380B9-EB65-450C-BF6A-A387495BF35F}" type="datetimeFigureOut">
               <a:rPr lang="en-US" smtClean="0"/>
-              <a:t>6/16/2017</a:t>
+              <a:t>1/18/2018</a:t>
             </a:fld>
             <a:endParaRPr lang="en-US" dirty="0"/>
           </a:p>
@@ -675,7 +675,7 @@
                 <a:latin typeface="Helvetica" pitchFamily="34" charset="0"/>
               </a:rPr>
               <a:pPr/>
-              <a:t>6/16/2017</a:t>
+              <a:t>1/18/2018</a:t>
             </a:fld>
             <a:endParaRPr lang="en-US" sz="900" b="1" dirty="0">
               <a:solidFill>
@@ -2125,24 +2125,15 @@
           <a:lstStyle/>
           <a:p>
             <a:r>
-              <a:rPr lang="en-US" dirty="0" smtClean="0"/>
-              <a:t>Jet </a:t>
-            </a:r>
-            <a:r>
-              <a:rPr lang="en-US" dirty="0"/>
-              <a:t>Propulsion </a:t>
-            </a:r>
-            <a:r>
-              <a:rPr lang="en-US" dirty="0" smtClean="0"/>
-              <a:t>Laboratory,</a:t>
-            </a:r>
-          </a:p>
-          <a:p>
-            <a:r>
-              <a:rPr lang="en-US" dirty="0" smtClean="0"/>
+              <a:rPr lang="en-US" dirty="0"/>
+              <a:t>Jet Propulsion Laboratory,</a:t>
+            </a:r>
+          </a:p>
+          <a:p>
+            <a:r>
+              <a:rPr lang="en-US" dirty="0"/>
               <a:t>California Institute of Technology</a:t>
             </a:r>
-            <a:endParaRPr lang="en-US" dirty="0"/>
           </a:p>
           <a:p>
             <a:r>
@@ -2151,7 +2142,7 @@
                   <a:srgbClr val="00B050"/>
                 </a:solidFill>
               </a:rPr>
-              <a:t>5/29/2017</a:t>
+              <a:t>1/18/2018</a:t>
             </a:r>
           </a:p>
         </p:txBody>
@@ -2606,7 +2597,7 @@
         <p:spPr>
           <a:xfrm>
             <a:off x="6096000" y="2057400"/>
-            <a:ext cx="1511952" cy="923330"/>
+            <a:ext cx="2916183" cy="923330"/>
           </a:xfrm>
           <a:prstGeom prst="rect">
             <a:avLst/>
@@ -2621,7 +2612,7 @@
           <a:p>
             <a:r>
               <a:rPr lang="en-US" dirty="0"/>
-              <a:t>TI MSP430</a:t>
+              <a:t>TI MSP430 Microcontroller</a:t>
             </a:r>
           </a:p>
           <a:p>
@@ -2699,12 +2690,8 @@
           <a:lstStyle/>
           <a:p>
             <a:r>
-              <a:rPr lang="en-US"/>
-              <a:t>Rack Mount </a:t>
-            </a:r>
-            <a:r>
-              <a:rPr lang="en-US" dirty="0"/>
-              <a:t>PC</a:t>
+              <a:rPr lang="en-US" dirty="0"/>
+              <a:t>Rack Mount PC</a:t>
             </a:r>
           </a:p>
           <a:p>
@@ -2830,7 +2817,7 @@
             <a:pPr lvl="1"/>
             <a:r>
               <a:rPr lang="en-US" dirty="0"/>
-              <a:t>Currently baselined for Sphinx Leon3 Avionics SOC</a:t>
+              <a:t>Currently baselined for JPL Sphinx Leon3 Avionics SOC</a:t>
             </a:r>
           </a:p>
           <a:p>
@@ -2843,7 +2830,7 @@
             <a:pPr lvl="1"/>
             <a:r>
               <a:rPr lang="en-US" dirty="0"/>
-              <a:t>Software components</a:t>
+              <a:t>Uses the concept of software components</a:t>
             </a:r>
           </a:p>
           <a:p>
@@ -2855,7 +2842,7 @@
           <a:p>
             <a:r>
               <a:rPr lang="en-US" dirty="0"/>
-              <a:t>Includes framework, code generators, build tools, Command/Telemetry GUI, and test environment</a:t>
+              <a:t>Includes framework, code generators, build tools, Command/Telemetry GUI, and unit test environment</a:t>
             </a:r>
           </a:p>
           <a:p>
@@ -2962,142 +2949,157 @@
           <a:lstStyle/>
           <a:p>
             <a:r>
-              <a:rPr lang="en-US" dirty="0"/>
+              <a:rPr lang="en-US" sz="1800" dirty="0"/>
               <a:t>Development</a:t>
             </a:r>
           </a:p>
           <a:p>
             <a:pPr lvl="1"/>
             <a:r>
-              <a:rPr lang="en-US" dirty="0"/>
+              <a:rPr lang="en-US" sz="1600" dirty="0"/>
               <a:t>Developed under JPL technology exploration task (2013)</a:t>
             </a:r>
           </a:p>
           <a:p>
             <a:pPr lvl="1"/>
             <a:r>
-              <a:rPr lang="en-US" dirty="0"/>
+              <a:rPr lang="en-US" sz="1600" dirty="0"/>
               <a:t>Matured under a number of JPL projects (2014-2017)</a:t>
             </a:r>
           </a:p>
           <a:p>
             <a:pPr lvl="1"/>
             <a:r>
-              <a:rPr lang="en-US" dirty="0"/>
+              <a:rPr lang="en-US" sz="1600" dirty="0"/>
               <a:t>Using established JPL flight processes/analysis tools</a:t>
             </a:r>
           </a:p>
           <a:p>
             <a:r>
-              <a:rPr lang="en-US" dirty="0"/>
+              <a:rPr lang="en-US" sz="1800" dirty="0"/>
+              <a:t>Flew on </a:t>
+            </a:r>
+            <a:r>
+              <a:rPr lang="en-US" sz="1800" dirty="0" err="1"/>
+              <a:t>RapidScat</a:t>
+            </a:r>
+            <a:r>
+              <a:rPr lang="en-US" sz="1800" dirty="0"/>
+              <a:t> (2014-2016)</a:t>
+            </a:r>
+          </a:p>
+          <a:p>
+            <a:pPr lvl="1"/>
+            <a:r>
+              <a:rPr lang="en-US" sz="1600" dirty="0"/>
+              <a:t>Radar experiment on ISS</a:t>
+            </a:r>
+          </a:p>
+          <a:p>
+            <a:pPr lvl="1"/>
+            <a:r>
+              <a:rPr lang="en-US" sz="1600" dirty="0"/>
+              <a:t>Very stable with no reported software </a:t>
+            </a:r>
+            <a:r>
+              <a:rPr lang="en-US" sz="1600" dirty="0" err="1"/>
+              <a:t>bugsf</a:t>
+            </a:r>
+            <a:endParaRPr lang="en-US" sz="1600" dirty="0"/>
+          </a:p>
+          <a:p>
+            <a:r>
+              <a:rPr lang="en-US" sz="1800" dirty="0"/>
               <a:t>Flying on </a:t>
             </a:r>
             <a:r>
-              <a:rPr lang="en-US" dirty="0" err="1"/>
-              <a:t>RapidScat</a:t>
-            </a:r>
-            <a:r>
-              <a:rPr lang="en-US" dirty="0"/>
-              <a:t> (Launched 2014)</a:t>
+              <a:rPr lang="en-US" sz="1800" dirty="0" err="1"/>
+              <a:t>Asteria</a:t>
+            </a:r>
+            <a:r>
+              <a:rPr lang="en-US" sz="1800" dirty="0"/>
+              <a:t> (</a:t>
+            </a:r>
+            <a:r>
+              <a:rPr lang="en-US" sz="1800" dirty="0" err="1"/>
+              <a:t>Cubesat</a:t>
+            </a:r>
+            <a:r>
+              <a:rPr lang="en-US" sz="1800" dirty="0"/>
+              <a:t>)</a:t>
             </a:r>
           </a:p>
           <a:p>
             <a:pPr lvl="1"/>
             <a:r>
-              <a:rPr lang="en-US" dirty="0"/>
-              <a:t>Radar experiment on ISS</a:t>
+              <a:rPr lang="en-US" sz="1600" dirty="0"/>
+              <a:t>Asteroid detection technology demonstrator</a:t>
+            </a:r>
+          </a:p>
+          <a:p>
+            <a:r>
+              <a:rPr lang="en-US" sz="1800" dirty="0"/>
+              <a:t>In development for:</a:t>
             </a:r>
           </a:p>
           <a:p>
             <a:pPr lvl="1"/>
             <a:r>
-              <a:rPr lang="en-US" dirty="0"/>
-              <a:t>No software bugs reported</a:t>
-            </a:r>
-          </a:p>
-          <a:p>
-            <a:r>
-              <a:rPr lang="en-US" dirty="0"/>
-              <a:t>Baselined for:</a:t>
+              <a:rPr lang="en-US" sz="1600" dirty="0"/>
+              <a:t>Mars Helicopter Technology Development</a:t>
             </a:r>
           </a:p>
           <a:p>
             <a:pPr lvl="1"/>
             <a:r>
-              <a:rPr lang="en-US" dirty="0"/>
-              <a:t>Leonardo (Mars Helicopter Technology Development)</a:t>
+              <a:rPr lang="en-US" sz="1600" dirty="0"/>
+              <a:t>Lunar Flashlight (</a:t>
+            </a:r>
+            <a:r>
+              <a:rPr lang="en-US" sz="1600" dirty="0" err="1"/>
+              <a:t>Cubesat</a:t>
+            </a:r>
+            <a:r>
+              <a:rPr lang="en-US" sz="1600" dirty="0"/>
+              <a:t>)</a:t>
             </a:r>
           </a:p>
           <a:p>
             <a:pPr lvl="1"/>
             <a:r>
-              <a:rPr lang="en-US" dirty="0" err="1"/>
-              <a:t>Asteria</a:t>
-            </a:r>
-            <a:r>
-              <a:rPr lang="en-US" dirty="0"/>
+              <a:rPr lang="en-US" sz="1600" dirty="0" err="1"/>
+              <a:t>NEAScout</a:t>
+            </a:r>
+            <a:r>
+              <a:rPr lang="en-US" sz="1600" dirty="0"/>
               <a:t> (</a:t>
             </a:r>
             <a:r>
-              <a:rPr lang="en-US" dirty="0" err="1"/>
+              <a:rPr lang="en-US" sz="1600" dirty="0" err="1"/>
               <a:t>Cubesat</a:t>
             </a:r>
             <a:r>
-              <a:rPr lang="en-US" dirty="0"/>
+              <a:rPr lang="en-US" sz="1600" dirty="0"/>
               <a:t>)</a:t>
             </a:r>
           </a:p>
           <a:p>
+            <a:r>
+              <a:rPr lang="en-US" sz="1800" dirty="0"/>
+              <a:t>Available on GitHub</a:t>
+            </a:r>
+          </a:p>
+          <a:p>
             <a:pPr lvl="1"/>
             <a:r>
-              <a:rPr lang="en-US" dirty="0"/>
-              <a:t>Lunar Flashlight (</a:t>
-            </a:r>
-            <a:r>
-              <a:rPr lang="en-US" dirty="0" err="1"/>
-              <a:t>Cubesat</a:t>
-            </a:r>
-            <a:r>
-              <a:rPr lang="en-US" dirty="0"/>
-              <a:t>)</a:t>
+              <a:rPr lang="en-US" sz="1600" dirty="0"/>
+              <a:t>Reference example can be run on Linux, MacOS, Cygwin and most embedded ARM processors (e.g. Raspberry Pi)</a:t>
             </a:r>
           </a:p>
           <a:p>
             <a:pPr lvl="1"/>
             <a:r>
-              <a:rPr lang="en-US" dirty="0" err="1"/>
-              <a:t>NEAScout</a:t>
-            </a:r>
-            <a:r>
-              <a:rPr lang="en-US" dirty="0"/>
-              <a:t> (</a:t>
-            </a:r>
-            <a:r>
-              <a:rPr lang="en-US" dirty="0" err="1"/>
-              <a:t>Cubesat</a:t>
-            </a:r>
-            <a:r>
-              <a:rPr lang="en-US" dirty="0"/>
-              <a:t>)</a:t>
-            </a:r>
-          </a:p>
-          <a:p>
-            <a:r>
-              <a:rPr lang="en-US" dirty="0"/>
-              <a:t>Available on GitHub</a:t>
-            </a:r>
-          </a:p>
-          <a:p>
-            <a:pPr lvl="1"/>
-            <a:r>
-              <a:rPr lang="en-US" dirty="0"/>
-              <a:t>Reference example can be run on Linux, MacOS, Cygwin and most embedded ARM processors (e.g. Raspberry Pi)</a:t>
-            </a:r>
-          </a:p>
-          <a:p>
-            <a:pPr lvl="1"/>
-            <a:r>
-              <a:rPr lang="en-US" dirty="0"/>
+              <a:rPr lang="en-US" sz="1600" dirty="0"/>
               <a:t>https://github.jpl.nasa.gov/FPRIME/fprime-sw.git</a:t>
             </a:r>
           </a:p>
@@ -3201,7 +3203,7 @@
           <a:p>
             <a:r>
               <a:rPr lang="en-US" dirty="0"/>
-              <a:t>Components are not dependent on other components, so can be reused.</a:t>
+              <a:t>Components are not dependent on other components, so can be easily reused.</a:t>
             </a:r>
           </a:p>
           <a:p>
@@ -4756,7 +4758,7 @@
           <a:p>
             <a:r>
               <a:rPr lang="en-US" dirty="0"/>
-              <a:t>Since these are common patterns, developer specifies in simple XML.</a:t>
+              <a:t>Developer specifies common patterns in simple XML.</a:t>
             </a:r>
           </a:p>
           <a:p>
@@ -5500,7 +5502,7 @@
             <a:pPr lvl="1"/>
             <a:r>
               <a:rPr lang="en-US" dirty="0"/>
-              <a:t>Provided with Python-based lightweight ground system</a:t>
+              <a:t>Python-based lightweight ground system is provided with code</a:t>
             </a:r>
           </a:p>
           <a:p>
@@ -6691,7 +6693,7 @@
           <a:p>
             <a:r>
               <a:rPr lang="en-US" sz="1800" dirty="0"/>
-              <a:t>For 2015-2016, C&amp;DH components have been taken through flight software processes</a:t>
+              <a:t>In 2015-2016, C&amp;DH components were taken through flight software processes</a:t>
             </a:r>
           </a:p>
           <a:p>

</xml_diff>